<commit_message>
Actualización Contenido Lección 6
Desarrollo Lección 6
</commit_message>
<xml_diff>
--- a/18-data-visualization/Contenido Semana 3/6.1. Presentación - Introducción a Coordenadas Geográficas.pptx
+++ b/18-data-visualization/Contenido Semana 3/6.1. Presentación - Introducción a Coordenadas Geográficas.pptx
@@ -5,35 +5,39 @@
     <p:sldMasterId id="2147483670" r:id="rId1"/>
   </p:sldMasterIdLst>
   <p:notesMasterIdLst>
-    <p:notesMasterId r:id="rId4"/>
+    <p:notesMasterId r:id="rId8"/>
   </p:notesMasterIdLst>
   <p:sldIdLst>
     <p:sldId id="282" r:id="rId2"/>
-    <p:sldId id="283" r:id="rId3"/>
+    <p:sldId id="284" r:id="rId3"/>
+    <p:sldId id="283" r:id="rId4"/>
+    <p:sldId id="285" r:id="rId5"/>
+    <p:sldId id="287" r:id="rId6"/>
+    <p:sldId id="286" r:id="rId7"/>
   </p:sldIdLst>
   <p:sldSz cx="9144000" cy="6858000" type="screen4x3"/>
   <p:notesSz cx="6858000" cy="9144000"/>
   <p:embeddedFontLst>
     <p:embeddedFont>
-      <p:font typeface="Raleway" panose="020B0604020202020204" charset="0"/>
-      <p:regular r:id="rId5"/>
-      <p:bold r:id="rId6"/>
-      <p:italic r:id="rId7"/>
-      <p:boldItalic r:id="rId8"/>
-    </p:embeddedFont>
-    <p:embeddedFont>
-      <p:font typeface="Calibri" panose="020F0502020204030204" pitchFamily="34" charset="0"/>
+      <p:font typeface="Montserrat" panose="020B0604020202020204" charset="0"/>
       <p:regular r:id="rId9"/>
       <p:bold r:id="rId10"/>
       <p:italic r:id="rId11"/>
       <p:boldItalic r:id="rId12"/>
     </p:embeddedFont>
     <p:embeddedFont>
-      <p:font typeface="Montserrat" panose="020B0604020202020204" charset="0"/>
+      <p:font typeface="Calibri" panose="020F0502020204030204" pitchFamily="34" charset="0"/>
       <p:regular r:id="rId13"/>
       <p:bold r:id="rId14"/>
       <p:italic r:id="rId15"/>
       <p:boldItalic r:id="rId16"/>
+    </p:embeddedFont>
+    <p:embeddedFont>
+      <p:font typeface="Raleway" panose="020B0604020202020204" charset="0"/>
+      <p:regular r:id="rId17"/>
+      <p:bold r:id="rId18"/>
+      <p:italic r:id="rId19"/>
+      <p:boldItalic r:id="rId20"/>
     </p:embeddedFont>
   </p:embeddedFontLst>
   <p:defaultTextStyle>
@@ -1318,7 +1322,431 @@
     </p:spTree>
     <p:extLst>
       <p:ext uri="{BB962C8B-B14F-4D97-AF65-F5344CB8AC3E}">
+        <p14:creationId xmlns:p14="http://schemas.microsoft.com/office/powerpoint/2010/main" val="2126604379"/>
+      </p:ext>
+    </p:extLst>
+  </p:cSld>
+  <p:clrMapOvr>
+    <a:masterClrMapping/>
+  </p:clrMapOvr>
+</p:notes>
+</file>
+
+<file path=ppt/notesSlides/notesSlide3.xml><?xml version="1.0" encoding="utf-8"?>
+<p:notes xmlns:a="http://schemas.openxmlformats.org/drawingml/2006/main" xmlns:r="http://schemas.openxmlformats.org/officeDocument/2006/relationships" xmlns:p="http://schemas.openxmlformats.org/presentationml/2006/main" showMasterSp="0" showMasterPhAnim="0">
+  <p:cSld>
+    <p:spTree>
+      <p:nvGrpSpPr>
+        <p:cNvPr id="1" name="Shape 389"/>
+        <p:cNvGrpSpPr/>
+        <p:nvPr/>
+      </p:nvGrpSpPr>
+      <p:grpSpPr>
+        <a:xfrm>
+          <a:off x="0" y="0"/>
+          <a:ext cx="0" cy="0"/>
+          <a:chOff x="0" y="0"/>
+          <a:chExt cx="0" cy="0"/>
+        </a:xfrm>
+      </p:grpSpPr>
+      <p:sp>
+        <p:nvSpPr>
+          <p:cNvPr id="390" name="Shape 390"/>
+          <p:cNvSpPr txBox="1">
+            <a:spLocks noGrp="1"/>
+          </p:cNvSpPr>
+          <p:nvPr>
+            <p:ph type="body" idx="1"/>
+          </p:nvPr>
+        </p:nvSpPr>
+        <p:spPr>
+          <a:xfrm>
+            <a:off x="685800" y="4343400"/>
+            <a:ext cx="5486400" cy="4114800"/>
+          </a:xfrm>
+          <a:prstGeom prst="rect">
+            <a:avLst/>
+          </a:prstGeom>
+        </p:spPr>
+        <p:txBody>
+          <a:bodyPr lIns="91425" tIns="91425" rIns="91425" bIns="91425" anchor="t" anchorCtr="0">
+            <a:noAutofit/>
+          </a:bodyPr>
+          <a:lstStyle/>
+          <a:p>
+            <a:pPr lvl="0">
+              <a:spcBef>
+                <a:spcPts val="0"/>
+              </a:spcBef>
+              <a:buNone/>
+            </a:pPr>
+            <a:endParaRPr/>
+          </a:p>
+        </p:txBody>
+      </p:sp>
+      <p:sp>
+        <p:nvSpPr>
+          <p:cNvPr id="391" name="Shape 391"/>
+          <p:cNvSpPr>
+            <a:spLocks noGrp="1" noRot="1" noChangeAspect="1"/>
+          </p:cNvSpPr>
+          <p:nvPr>
+            <p:ph type="sldImg" idx="2"/>
+          </p:nvPr>
+        </p:nvSpPr>
+        <p:spPr>
+          <a:xfrm>
+            <a:off x="1143000" y="685800"/>
+            <a:ext cx="4572000" cy="3429000"/>
+          </a:xfrm>
+          <a:custGeom>
+            <a:avLst/>
+            <a:gdLst/>
+            <a:ahLst/>
+            <a:cxnLst/>
+            <a:rect l="0" t="0" r="0" b="0"/>
+            <a:pathLst>
+              <a:path w="120000" h="120000" extrusionOk="0">
+                <a:moveTo>
+                  <a:pt x="0" y="0"/>
+                </a:moveTo>
+                <a:lnTo>
+                  <a:pt x="120000" y="0"/>
+                </a:lnTo>
+                <a:lnTo>
+                  <a:pt x="120000" y="120000"/>
+                </a:lnTo>
+                <a:lnTo>
+                  <a:pt x="0" y="120000"/>
+                </a:lnTo>
+                <a:close/>
+              </a:path>
+            </a:pathLst>
+          </a:custGeom>
+        </p:spPr>
+      </p:sp>
+    </p:spTree>
+    <p:extLst>
+      <p:ext uri="{BB962C8B-B14F-4D97-AF65-F5344CB8AC3E}">
         <p14:creationId xmlns:p14="http://schemas.microsoft.com/office/powerpoint/2010/main" val="2401736586"/>
+      </p:ext>
+    </p:extLst>
+  </p:cSld>
+  <p:clrMapOvr>
+    <a:masterClrMapping/>
+  </p:clrMapOvr>
+</p:notes>
+</file>
+
+<file path=ppt/notesSlides/notesSlide4.xml><?xml version="1.0" encoding="utf-8"?>
+<p:notes xmlns:a="http://schemas.openxmlformats.org/drawingml/2006/main" xmlns:r="http://schemas.openxmlformats.org/officeDocument/2006/relationships" xmlns:p="http://schemas.openxmlformats.org/presentationml/2006/main" showMasterSp="0" showMasterPhAnim="0">
+  <p:cSld>
+    <p:spTree>
+      <p:nvGrpSpPr>
+        <p:cNvPr id="1" name="Shape 389"/>
+        <p:cNvGrpSpPr/>
+        <p:nvPr/>
+      </p:nvGrpSpPr>
+      <p:grpSpPr>
+        <a:xfrm>
+          <a:off x="0" y="0"/>
+          <a:ext cx="0" cy="0"/>
+          <a:chOff x="0" y="0"/>
+          <a:chExt cx="0" cy="0"/>
+        </a:xfrm>
+      </p:grpSpPr>
+      <p:sp>
+        <p:nvSpPr>
+          <p:cNvPr id="390" name="Shape 390"/>
+          <p:cNvSpPr txBox="1">
+            <a:spLocks noGrp="1"/>
+          </p:cNvSpPr>
+          <p:nvPr>
+            <p:ph type="body" idx="1"/>
+          </p:nvPr>
+        </p:nvSpPr>
+        <p:spPr>
+          <a:xfrm>
+            <a:off x="685800" y="4343400"/>
+            <a:ext cx="5486400" cy="4114800"/>
+          </a:xfrm>
+          <a:prstGeom prst="rect">
+            <a:avLst/>
+          </a:prstGeom>
+        </p:spPr>
+        <p:txBody>
+          <a:bodyPr lIns="91425" tIns="91425" rIns="91425" bIns="91425" anchor="t" anchorCtr="0">
+            <a:noAutofit/>
+          </a:bodyPr>
+          <a:lstStyle/>
+          <a:p>
+            <a:pPr lvl="0">
+              <a:spcBef>
+                <a:spcPts val="0"/>
+              </a:spcBef>
+              <a:buNone/>
+            </a:pPr>
+            <a:endParaRPr/>
+          </a:p>
+        </p:txBody>
+      </p:sp>
+      <p:sp>
+        <p:nvSpPr>
+          <p:cNvPr id="391" name="Shape 391"/>
+          <p:cNvSpPr>
+            <a:spLocks noGrp="1" noRot="1" noChangeAspect="1"/>
+          </p:cNvSpPr>
+          <p:nvPr>
+            <p:ph type="sldImg" idx="2"/>
+          </p:nvPr>
+        </p:nvSpPr>
+        <p:spPr>
+          <a:xfrm>
+            <a:off x="1143000" y="685800"/>
+            <a:ext cx="4572000" cy="3429000"/>
+          </a:xfrm>
+          <a:custGeom>
+            <a:avLst/>
+            <a:gdLst/>
+            <a:ahLst/>
+            <a:cxnLst/>
+            <a:rect l="0" t="0" r="0" b="0"/>
+            <a:pathLst>
+              <a:path w="120000" h="120000" extrusionOk="0">
+                <a:moveTo>
+                  <a:pt x="0" y="0"/>
+                </a:moveTo>
+                <a:lnTo>
+                  <a:pt x="120000" y="0"/>
+                </a:lnTo>
+                <a:lnTo>
+                  <a:pt x="120000" y="120000"/>
+                </a:lnTo>
+                <a:lnTo>
+                  <a:pt x="0" y="120000"/>
+                </a:lnTo>
+                <a:close/>
+              </a:path>
+            </a:pathLst>
+          </a:custGeom>
+        </p:spPr>
+      </p:sp>
+    </p:spTree>
+    <p:extLst>
+      <p:ext uri="{BB962C8B-B14F-4D97-AF65-F5344CB8AC3E}">
+        <p14:creationId xmlns:p14="http://schemas.microsoft.com/office/powerpoint/2010/main" val="1723415851"/>
+      </p:ext>
+    </p:extLst>
+  </p:cSld>
+  <p:clrMapOvr>
+    <a:masterClrMapping/>
+  </p:clrMapOvr>
+</p:notes>
+</file>
+
+<file path=ppt/notesSlides/notesSlide5.xml><?xml version="1.0" encoding="utf-8"?>
+<p:notes xmlns:a="http://schemas.openxmlformats.org/drawingml/2006/main" xmlns:r="http://schemas.openxmlformats.org/officeDocument/2006/relationships" xmlns:p="http://schemas.openxmlformats.org/presentationml/2006/main" showMasterSp="0" showMasterPhAnim="0">
+  <p:cSld>
+    <p:spTree>
+      <p:nvGrpSpPr>
+        <p:cNvPr id="1" name="Shape 389"/>
+        <p:cNvGrpSpPr/>
+        <p:nvPr/>
+      </p:nvGrpSpPr>
+      <p:grpSpPr>
+        <a:xfrm>
+          <a:off x="0" y="0"/>
+          <a:ext cx="0" cy="0"/>
+          <a:chOff x="0" y="0"/>
+          <a:chExt cx="0" cy="0"/>
+        </a:xfrm>
+      </p:grpSpPr>
+      <p:sp>
+        <p:nvSpPr>
+          <p:cNvPr id="390" name="Shape 390"/>
+          <p:cNvSpPr txBox="1">
+            <a:spLocks noGrp="1"/>
+          </p:cNvSpPr>
+          <p:nvPr>
+            <p:ph type="body" idx="1"/>
+          </p:nvPr>
+        </p:nvSpPr>
+        <p:spPr>
+          <a:xfrm>
+            <a:off x="685800" y="4343400"/>
+            <a:ext cx="5486400" cy="4114800"/>
+          </a:xfrm>
+          <a:prstGeom prst="rect">
+            <a:avLst/>
+          </a:prstGeom>
+        </p:spPr>
+        <p:txBody>
+          <a:bodyPr lIns="91425" tIns="91425" rIns="91425" bIns="91425" anchor="t" anchorCtr="0">
+            <a:noAutofit/>
+          </a:bodyPr>
+          <a:lstStyle/>
+          <a:p>
+            <a:pPr lvl="0">
+              <a:spcBef>
+                <a:spcPts val="0"/>
+              </a:spcBef>
+              <a:buNone/>
+            </a:pPr>
+            <a:endParaRPr/>
+          </a:p>
+        </p:txBody>
+      </p:sp>
+      <p:sp>
+        <p:nvSpPr>
+          <p:cNvPr id="391" name="Shape 391"/>
+          <p:cNvSpPr>
+            <a:spLocks noGrp="1" noRot="1" noChangeAspect="1"/>
+          </p:cNvSpPr>
+          <p:nvPr>
+            <p:ph type="sldImg" idx="2"/>
+          </p:nvPr>
+        </p:nvSpPr>
+        <p:spPr>
+          <a:xfrm>
+            <a:off x="1143000" y="685800"/>
+            <a:ext cx="4572000" cy="3429000"/>
+          </a:xfrm>
+          <a:custGeom>
+            <a:avLst/>
+            <a:gdLst/>
+            <a:ahLst/>
+            <a:cxnLst/>
+            <a:rect l="0" t="0" r="0" b="0"/>
+            <a:pathLst>
+              <a:path w="120000" h="120000" extrusionOk="0">
+                <a:moveTo>
+                  <a:pt x="0" y="0"/>
+                </a:moveTo>
+                <a:lnTo>
+                  <a:pt x="120000" y="0"/>
+                </a:lnTo>
+                <a:lnTo>
+                  <a:pt x="120000" y="120000"/>
+                </a:lnTo>
+                <a:lnTo>
+                  <a:pt x="0" y="120000"/>
+                </a:lnTo>
+                <a:close/>
+              </a:path>
+            </a:pathLst>
+          </a:custGeom>
+        </p:spPr>
+      </p:sp>
+    </p:spTree>
+    <p:extLst>
+      <p:ext uri="{BB962C8B-B14F-4D97-AF65-F5344CB8AC3E}">
+        <p14:creationId xmlns:p14="http://schemas.microsoft.com/office/powerpoint/2010/main" val="774273949"/>
+      </p:ext>
+    </p:extLst>
+  </p:cSld>
+  <p:clrMapOvr>
+    <a:masterClrMapping/>
+  </p:clrMapOvr>
+</p:notes>
+</file>
+
+<file path=ppt/notesSlides/notesSlide6.xml><?xml version="1.0" encoding="utf-8"?>
+<p:notes xmlns:a="http://schemas.openxmlformats.org/drawingml/2006/main" xmlns:r="http://schemas.openxmlformats.org/officeDocument/2006/relationships" xmlns:p="http://schemas.openxmlformats.org/presentationml/2006/main" showMasterSp="0" showMasterPhAnim="0">
+  <p:cSld>
+    <p:spTree>
+      <p:nvGrpSpPr>
+        <p:cNvPr id="1" name="Shape 389"/>
+        <p:cNvGrpSpPr/>
+        <p:nvPr/>
+      </p:nvGrpSpPr>
+      <p:grpSpPr>
+        <a:xfrm>
+          <a:off x="0" y="0"/>
+          <a:ext cx="0" cy="0"/>
+          <a:chOff x="0" y="0"/>
+          <a:chExt cx="0" cy="0"/>
+        </a:xfrm>
+      </p:grpSpPr>
+      <p:sp>
+        <p:nvSpPr>
+          <p:cNvPr id="390" name="Shape 390"/>
+          <p:cNvSpPr txBox="1">
+            <a:spLocks noGrp="1"/>
+          </p:cNvSpPr>
+          <p:nvPr>
+            <p:ph type="body" idx="1"/>
+          </p:nvPr>
+        </p:nvSpPr>
+        <p:spPr>
+          <a:xfrm>
+            <a:off x="685800" y="4343400"/>
+            <a:ext cx="5486400" cy="4114800"/>
+          </a:xfrm>
+          <a:prstGeom prst="rect">
+            <a:avLst/>
+          </a:prstGeom>
+        </p:spPr>
+        <p:txBody>
+          <a:bodyPr lIns="91425" tIns="91425" rIns="91425" bIns="91425" anchor="t" anchorCtr="0">
+            <a:noAutofit/>
+          </a:bodyPr>
+          <a:lstStyle/>
+          <a:p>
+            <a:pPr lvl="0">
+              <a:spcBef>
+                <a:spcPts val="0"/>
+              </a:spcBef>
+              <a:buNone/>
+            </a:pPr>
+            <a:endParaRPr/>
+          </a:p>
+        </p:txBody>
+      </p:sp>
+      <p:sp>
+        <p:nvSpPr>
+          <p:cNvPr id="391" name="Shape 391"/>
+          <p:cNvSpPr>
+            <a:spLocks noGrp="1" noRot="1" noChangeAspect="1"/>
+          </p:cNvSpPr>
+          <p:nvPr>
+            <p:ph type="sldImg" idx="2"/>
+          </p:nvPr>
+        </p:nvSpPr>
+        <p:spPr>
+          <a:xfrm>
+            <a:off x="1143000" y="685800"/>
+            <a:ext cx="4572000" cy="3429000"/>
+          </a:xfrm>
+          <a:custGeom>
+            <a:avLst/>
+            <a:gdLst/>
+            <a:ahLst/>
+            <a:cxnLst/>
+            <a:rect l="0" t="0" r="0" b="0"/>
+            <a:pathLst>
+              <a:path w="120000" h="120000" extrusionOk="0">
+                <a:moveTo>
+                  <a:pt x="0" y="0"/>
+                </a:moveTo>
+                <a:lnTo>
+                  <a:pt x="120000" y="0"/>
+                </a:lnTo>
+                <a:lnTo>
+                  <a:pt x="120000" y="120000"/>
+                </a:lnTo>
+                <a:lnTo>
+                  <a:pt x="0" y="120000"/>
+                </a:lnTo>
+                <a:close/>
+              </a:path>
+            </a:pathLst>
+          </a:custGeom>
+        </p:spPr>
+      </p:sp>
+    </p:spTree>
+    <p:extLst>
+      <p:ext uri="{BB962C8B-B14F-4D97-AF65-F5344CB8AC3E}">
+        <p14:creationId xmlns:p14="http://schemas.microsoft.com/office/powerpoint/2010/main" val="3129182102"/>
       </p:ext>
     </p:extLst>
   </p:cSld>
@@ -10104,8 +10532,8 @@
         </p:nvSpPr>
         <p:spPr>
           <a:xfrm>
-            <a:off x="457200" y="1628481"/>
-            <a:ext cx="8229600" cy="4526100"/>
+            <a:off x="457200" y="5312003"/>
+            <a:ext cx="8229600" cy="842577"/>
           </a:xfrm>
           <a:prstGeom prst="rect">
             <a:avLst/>
@@ -10121,29 +10549,65 @@
           </a:bodyPr>
           <a:lstStyle/>
           <a:p>
-            <a:pPr marL="0" marR="0" lvl="0" indent="0" algn="l" rtl="0">
+            <a:pPr marL="0" lvl="0" indent="0">
               <a:lnSpc>
                 <a:spcPct val="90000"/>
               </a:lnSpc>
               <a:spcBef>
                 <a:spcPts val="0"/>
               </a:spcBef>
-              <a:buClr>
-                <a:schemeClr val="dk1"/>
-              </a:buClr>
               <a:buSzPct val="25000"/>
-              <a:buFont typeface="Arial"/>
               <a:buNone/>
             </a:pPr>
             <a:r>
-              <a:rPr lang="es-VE" sz="1850" b="0" i="0" u="none" strike="noStrike" cap="none" dirty="0">
-                <a:solidFill>
-                  <a:schemeClr val="dk1"/>
-                </a:solidFill>
+              <a:rPr lang="es-VE" sz="1600" dirty="0">
+                <a:latin typeface="Raleway" panose="020B0604020202020204" charset="0"/>
               </a:rPr>
-              <a:t>Texto</a:t>
+              <a:t>Fuente y más información en</a:t>
             </a:r>
-            <a:endParaRPr lang="es-VE" sz="1850" dirty="0"/>
+            <a:r>
+              <a:rPr lang="es-VE" sz="1850" dirty="0">
+                <a:latin typeface="Raleway" panose="020B0604020202020204" charset="0"/>
+              </a:rPr>
+              <a:t>: </a:t>
+            </a:r>
+          </a:p>
+          <a:p>
+            <a:pPr marL="0" lvl="0" indent="0">
+              <a:lnSpc>
+                <a:spcPct val="90000"/>
+              </a:lnSpc>
+              <a:spcBef>
+                <a:spcPts val="0"/>
+              </a:spcBef>
+              <a:buSzPct val="25000"/>
+              <a:buNone/>
+            </a:pPr>
+            <a:r>
+              <a:rPr lang="es-VE" sz="1200" dirty="0">
+                <a:latin typeface="Raleway" panose="020B0604020202020204" charset="0"/>
+                <a:hlinkClick r:id="rId3"/>
+              </a:rPr>
+              <a:t>http://desktop.arcgis.com/es/arcmap/10.3/guide-books/map-projections/about-geographic-coordinate-systems.htm</a:t>
+            </a:r>
+            <a:endParaRPr lang="es-VE" sz="1200" dirty="0">
+              <a:latin typeface="Raleway" panose="020B0604020202020204" charset="0"/>
+            </a:endParaRPr>
+          </a:p>
+          <a:p>
+            <a:pPr marL="0" lvl="0" indent="0">
+              <a:lnSpc>
+                <a:spcPct val="90000"/>
+              </a:lnSpc>
+              <a:spcBef>
+                <a:spcPts val="0"/>
+              </a:spcBef>
+              <a:buSzPct val="25000"/>
+              <a:buNone/>
+            </a:pPr>
+            <a:endParaRPr lang="es-VE" sz="1200" dirty="0">
+              <a:latin typeface="Raleway" panose="020B0604020202020204" charset="0"/>
+            </a:endParaRPr>
           </a:p>
         </p:txBody>
       </p:sp>
@@ -10176,19 +10640,14 @@
           </a:bodyPr>
           <a:lstStyle/>
           <a:p>
-            <a:pPr marL="0" marR="0" lvl="0" indent="0" algn="l" rtl="0">
-              <a:spcBef>
-                <a:spcPts val="0"/>
-              </a:spcBef>
+            <a:pPr lvl="0" algn="l">
               <a:buClr>
                 <a:srgbClr val="F7B600"/>
               </a:buClr>
               <a:buSzPct val="25000"/>
-              <a:buFont typeface="Arial"/>
-              <a:buNone/>
             </a:pPr>
             <a:r>
-              <a:rPr lang="es-VE" sz="1200" i="0" u="none" strike="noStrike" cap="none" dirty="0">
+              <a:rPr lang="es-VE" sz="1200" dirty="0">
                 <a:solidFill>
                   <a:srgbClr val="F7B600"/>
                 </a:solidFill>
@@ -10199,6 +10658,15 @@
               </a:rPr>
               <a:t>6.1 Introducción a Coordenadas Geográficas</a:t>
             </a:r>
+            <a:endParaRPr lang="es-VE" sz="1200" i="0" u="none" strike="noStrike" cap="none" dirty="0">
+              <a:solidFill>
+                <a:srgbClr val="F7B600"/>
+              </a:solidFill>
+              <a:latin typeface="Montserrat"/>
+              <a:ea typeface="Montserrat"/>
+              <a:cs typeface="Montserrat"/>
+              <a:sym typeface="Montserrat"/>
+            </a:endParaRPr>
           </a:p>
         </p:txBody>
       </p:sp>
@@ -10209,7 +10677,7 @@
           <p:nvPr/>
         </p:nvPicPr>
         <p:blipFill rotWithShape="1">
-          <a:blip r:embed="rId3">
+          <a:blip r:embed="rId4">
             <a:alphaModFix/>
           </a:blip>
           <a:srcRect/>
@@ -10271,7 +10739,7 @@
                 <a:cs typeface="Raleway"/>
                 <a:sym typeface="Raleway"/>
               </a:rPr>
-              <a:t>Título</a:t>
+              <a:t>Coordenadas Geográficas</a:t>
             </a:r>
             <a:endParaRPr lang="es-GT" sz="3600" b="0" i="0" u="none" strike="noStrike" cap="none" dirty="0">
               <a:solidFill>
@@ -10285,10 +10753,1475 @@
           </a:p>
         </p:txBody>
       </p:sp>
+      <p:pic>
+        <p:nvPicPr>
+          <p:cNvPr id="1026" name="Picture 2" descr="Ilustración de los paralelos y los meridianos que forman una retícula">
+            <a:extLst>
+              <a:ext uri="{FF2B5EF4-FFF2-40B4-BE49-F238E27FC236}">
+                <a16:creationId xmlns:a16="http://schemas.microsoft.com/office/drawing/2014/main" id="{84DFB543-849E-47E3-9F07-AD5E9A13B491}"/>
+              </a:ext>
+            </a:extLst>
+          </p:cNvPr>
+          <p:cNvPicPr>
+            <a:picLocks noChangeAspect="1" noChangeArrowheads="1"/>
+          </p:cNvPicPr>
+          <p:nvPr/>
+        </p:nvPicPr>
+        <p:blipFill>
+          <a:blip r:embed="rId5">
+            <a:extLst>
+              <a:ext uri="{28A0092B-C50C-407E-A947-70E740481C1C}">
+                <a14:useLocalDpi xmlns:a14="http://schemas.microsoft.com/office/drawing/2010/main" val="0"/>
+              </a:ext>
+            </a:extLst>
+          </a:blip>
+          <a:srcRect/>
+          <a:stretch>
+            <a:fillRect/>
+          </a:stretch>
+        </p:blipFill>
+        <p:spPr bwMode="auto">
+          <a:xfrm>
+            <a:off x="322573" y="2214221"/>
+            <a:ext cx="5923299" cy="1602900"/>
+          </a:xfrm>
+          <a:prstGeom prst="rect">
+            <a:avLst/>
+          </a:prstGeom>
+          <a:noFill/>
+          <a:extLst>
+            <a:ext uri="{909E8E84-426E-40DD-AFC4-6F175D3DCCD1}">
+              <a14:hiddenFill xmlns:a14="http://schemas.microsoft.com/office/drawing/2010/main">
+                <a:solidFill>
+                  <a:srgbClr val="FFFFFF"/>
+                </a:solidFill>
+              </a14:hiddenFill>
+            </a:ext>
+          </a:extLst>
+        </p:spPr>
+      </p:pic>
+      <p:pic>
+        <p:nvPicPr>
+          <p:cNvPr id="1028" name="Picture 4" descr="Ilustración de un globo con valores de longitud y latitud">
+            <a:extLst>
+              <a:ext uri="{FF2B5EF4-FFF2-40B4-BE49-F238E27FC236}">
+                <a16:creationId xmlns:a16="http://schemas.microsoft.com/office/drawing/2014/main" id="{80C51602-D15B-45D1-A664-20BC3D851F99}"/>
+              </a:ext>
+            </a:extLst>
+          </p:cNvPr>
+          <p:cNvPicPr>
+            <a:picLocks noChangeAspect="1" noChangeArrowheads="1"/>
+          </p:cNvPicPr>
+          <p:nvPr/>
+        </p:nvPicPr>
+        <p:blipFill>
+          <a:blip r:embed="rId6">
+            <a:extLst>
+              <a:ext uri="{28A0092B-C50C-407E-A947-70E740481C1C}">
+                <a14:useLocalDpi xmlns:a14="http://schemas.microsoft.com/office/drawing/2010/main" val="0"/>
+              </a:ext>
+            </a:extLst>
+          </a:blip>
+          <a:srcRect/>
+          <a:stretch>
+            <a:fillRect/>
+          </a:stretch>
+        </p:blipFill>
+        <p:spPr bwMode="auto">
+          <a:xfrm>
+            <a:off x="6858000" y="2132233"/>
+            <a:ext cx="1895475" cy="1905000"/>
+          </a:xfrm>
+          <a:prstGeom prst="rect">
+            <a:avLst/>
+          </a:prstGeom>
+          <a:noFill/>
+          <a:extLst>
+            <a:ext uri="{909E8E84-426E-40DD-AFC4-6F175D3DCCD1}">
+              <a14:hiddenFill xmlns:a14="http://schemas.microsoft.com/office/drawing/2010/main">
+                <a:solidFill>
+                  <a:srgbClr val="FFFFFF"/>
+                </a:solidFill>
+              </a14:hiddenFill>
+            </a:ext>
+          </a:extLst>
+        </p:spPr>
+      </p:pic>
+      <p:sp>
+        <p:nvSpPr>
+          <p:cNvPr id="2" name="TextBox 1">
+            <a:extLst>
+              <a:ext uri="{FF2B5EF4-FFF2-40B4-BE49-F238E27FC236}">
+                <a16:creationId xmlns:a16="http://schemas.microsoft.com/office/drawing/2014/main" id="{B437EAD5-72A5-4F9D-8CA1-14EAE5DCA3F1}"/>
+              </a:ext>
+            </a:extLst>
+          </p:cNvPr>
+          <p:cNvSpPr txBox="1"/>
+          <p:nvPr/>
+        </p:nvSpPr>
+        <p:spPr>
+          <a:xfrm flipH="1">
+            <a:off x="-437943" y="4256725"/>
+            <a:ext cx="2980285" cy="523220"/>
+          </a:xfrm>
+          <a:prstGeom prst="rect">
+            <a:avLst/>
+          </a:prstGeom>
+          <a:noFill/>
+        </p:spPr>
+        <p:txBody>
+          <a:bodyPr wrap="square" rtlCol="0">
+            <a:spAutoFit/>
+          </a:bodyPr>
+          <a:lstStyle/>
+          <a:p>
+            <a:pPr algn="ctr"/>
+            <a:r>
+              <a:rPr lang="es-VE" dirty="0">
+                <a:latin typeface="Raleway" panose="020B0604020202020204" charset="0"/>
+              </a:rPr>
+              <a:t>Latitud </a:t>
+            </a:r>
+          </a:p>
+          <a:p>
+            <a:pPr algn="ctr"/>
+            <a:r>
+              <a:rPr lang="es-VE" dirty="0">
+                <a:latin typeface="Raleway" panose="020B0604020202020204" charset="0"/>
+              </a:rPr>
+              <a:t>define paralelos</a:t>
+            </a:r>
+            <a:endParaRPr lang="en-US" dirty="0">
+              <a:latin typeface="Raleway" panose="020B0604020202020204" charset="0"/>
+            </a:endParaRPr>
+          </a:p>
+        </p:txBody>
+      </p:sp>
+      <p:sp>
+        <p:nvSpPr>
+          <p:cNvPr id="9" name="TextBox 8">
+            <a:extLst>
+              <a:ext uri="{FF2B5EF4-FFF2-40B4-BE49-F238E27FC236}">
+                <a16:creationId xmlns:a16="http://schemas.microsoft.com/office/drawing/2014/main" id="{55F34AC2-3A69-4CB8-88CD-31E25611B56E}"/>
+              </a:ext>
+            </a:extLst>
+          </p:cNvPr>
+          <p:cNvSpPr txBox="1"/>
+          <p:nvPr/>
+        </p:nvSpPr>
+        <p:spPr>
+          <a:xfrm flipH="1">
+            <a:off x="1748192" y="4223243"/>
+            <a:ext cx="2980285" cy="523220"/>
+          </a:xfrm>
+          <a:prstGeom prst="rect">
+            <a:avLst/>
+          </a:prstGeom>
+          <a:noFill/>
+        </p:spPr>
+        <p:txBody>
+          <a:bodyPr wrap="square" rtlCol="0">
+            <a:spAutoFit/>
+          </a:bodyPr>
+          <a:lstStyle/>
+          <a:p>
+            <a:pPr algn="ctr"/>
+            <a:r>
+              <a:rPr lang="es-VE" dirty="0">
+                <a:latin typeface="Raleway" panose="020B0604020202020204" charset="0"/>
+              </a:rPr>
+              <a:t>Longitud  </a:t>
+            </a:r>
+          </a:p>
+          <a:p>
+            <a:pPr algn="ctr"/>
+            <a:r>
+              <a:rPr lang="es-VE" dirty="0">
+                <a:latin typeface="Raleway" panose="020B0604020202020204" charset="0"/>
+              </a:rPr>
+              <a:t>define meridianos</a:t>
+            </a:r>
+            <a:endParaRPr lang="en-US" dirty="0">
+              <a:latin typeface="Raleway" panose="020B0604020202020204" charset="0"/>
+            </a:endParaRPr>
+          </a:p>
+        </p:txBody>
+      </p:sp>
+      <p:sp>
+        <p:nvSpPr>
+          <p:cNvPr id="10" name="TextBox 9">
+            <a:extLst>
+              <a:ext uri="{FF2B5EF4-FFF2-40B4-BE49-F238E27FC236}">
+                <a16:creationId xmlns:a16="http://schemas.microsoft.com/office/drawing/2014/main" id="{9DEACD23-66D1-49A0-99E5-70BF2D1402C1}"/>
+              </a:ext>
+            </a:extLst>
+          </p:cNvPr>
+          <p:cNvSpPr txBox="1"/>
+          <p:nvPr/>
+        </p:nvSpPr>
+        <p:spPr>
+          <a:xfrm flipH="1">
+            <a:off x="4213638" y="4318055"/>
+            <a:ext cx="5127318" cy="307777"/>
+          </a:xfrm>
+          <a:prstGeom prst="rect">
+            <a:avLst/>
+          </a:prstGeom>
+          <a:noFill/>
+        </p:spPr>
+        <p:txBody>
+          <a:bodyPr wrap="square" rtlCol="0">
+            <a:spAutoFit/>
+          </a:bodyPr>
+          <a:lstStyle/>
+          <a:p>
+            <a:pPr algn="ctr"/>
+            <a:r>
+              <a:rPr lang="es-VE" dirty="0">
+                <a:latin typeface="Raleway" panose="020B0604020202020204" charset="0"/>
+              </a:rPr>
+              <a:t>Juntas son las coordenadas geográficas de un punto</a:t>
+            </a:r>
+            <a:endParaRPr lang="en-US" dirty="0">
+              <a:latin typeface="Raleway" panose="020B0604020202020204" charset="0"/>
+            </a:endParaRPr>
+          </a:p>
+        </p:txBody>
+      </p:sp>
+    </p:spTree>
+    <p:extLst>
+      <p:ext uri="{BB962C8B-B14F-4D97-AF65-F5344CB8AC3E}">
+        <p14:creationId xmlns:p14="http://schemas.microsoft.com/office/powerpoint/2010/main" val="213026059"/>
+      </p:ext>
+    </p:extLst>
+  </p:cSld>
+  <p:clrMapOvr>
+    <a:masterClrMapping/>
+  </p:clrMapOvr>
+</p:sld>
+</file>
+
+<file path=ppt/slides/slide3.xml><?xml version="1.0" encoding="utf-8"?>
+<p:sld xmlns:a="http://schemas.openxmlformats.org/drawingml/2006/main" xmlns:r="http://schemas.openxmlformats.org/officeDocument/2006/relationships" xmlns:p="http://schemas.openxmlformats.org/presentationml/2006/main">
+  <p:cSld>
+    <p:spTree>
+      <p:nvGrpSpPr>
+        <p:cNvPr id="1" name="Shape 392"/>
+        <p:cNvGrpSpPr/>
+        <p:nvPr/>
+      </p:nvGrpSpPr>
+      <p:grpSpPr>
+        <a:xfrm>
+          <a:off x="0" y="0"/>
+          <a:ext cx="0" cy="0"/>
+          <a:chOff x="0" y="0"/>
+          <a:chExt cx="0" cy="0"/>
+        </a:xfrm>
+      </p:grpSpPr>
+      <p:sp>
+        <p:nvSpPr>
+          <p:cNvPr id="394" name="Shape 394"/>
+          <p:cNvSpPr txBox="1">
+            <a:spLocks noGrp="1"/>
+          </p:cNvSpPr>
+          <p:nvPr>
+            <p:ph type="title"/>
+          </p:nvPr>
+        </p:nvSpPr>
+        <p:spPr>
+          <a:xfrm>
+            <a:off x="666539" y="209956"/>
+            <a:ext cx="5192220" cy="428400"/>
+          </a:xfrm>
+          <a:prstGeom prst="rect">
+            <a:avLst/>
+          </a:prstGeom>
+          <a:noFill/>
+          <a:ln>
+            <a:noFill/>
+          </a:ln>
+        </p:spPr>
+        <p:txBody>
+          <a:bodyPr lIns="91425" tIns="45700" rIns="91425" bIns="45700" anchor="ctr" anchorCtr="0">
+            <a:noAutofit/>
+          </a:bodyPr>
+          <a:lstStyle/>
+          <a:p>
+            <a:pPr marL="0" marR="0" lvl="0" indent="0" algn="l" rtl="0">
+              <a:spcBef>
+                <a:spcPts val="0"/>
+              </a:spcBef>
+              <a:buClr>
+                <a:srgbClr val="F7B600"/>
+              </a:buClr>
+              <a:buSzPct val="25000"/>
+              <a:buFont typeface="Arial"/>
+              <a:buNone/>
+            </a:pPr>
+            <a:r>
+              <a:rPr lang="es-VE" sz="1200" i="0" u="none" strike="noStrike" cap="none" dirty="0">
+                <a:solidFill>
+                  <a:srgbClr val="F7B600"/>
+                </a:solidFill>
+                <a:latin typeface="Montserrat"/>
+                <a:ea typeface="Montserrat"/>
+                <a:cs typeface="Montserrat"/>
+                <a:sym typeface="Montserrat"/>
+              </a:rPr>
+              <a:t>6.1 Introducción a Coordenadas Geográficas</a:t>
+            </a:r>
+          </a:p>
+        </p:txBody>
+      </p:sp>
+      <p:pic>
+        <p:nvPicPr>
+          <p:cNvPr id="395" name="Shape 395" descr="isotipo codeacademy.png"/>
+          <p:cNvPicPr preferRelativeResize="0"/>
+          <p:nvPr/>
+        </p:nvPicPr>
+        <p:blipFill rotWithShape="1">
+          <a:blip r:embed="rId4">
+            <a:alphaModFix/>
+          </a:blip>
+          <a:srcRect/>
+          <a:stretch/>
+        </p:blipFill>
+        <p:spPr>
+          <a:xfrm>
+            <a:off x="131781" y="126082"/>
+            <a:ext cx="548100" cy="548100"/>
+          </a:xfrm>
+          <a:prstGeom prst="rect">
+            <a:avLst/>
+          </a:prstGeom>
+          <a:noFill/>
+          <a:ln>
+            <a:noFill/>
+          </a:ln>
+        </p:spPr>
+      </p:pic>
+      <p:sp>
+        <p:nvSpPr>
+          <p:cNvPr id="396" name="Shape 396"/>
+          <p:cNvSpPr txBox="1"/>
+          <p:nvPr/>
+        </p:nvSpPr>
+        <p:spPr>
+          <a:xfrm>
+            <a:off x="1117077" y="674182"/>
+            <a:ext cx="7107810" cy="646200"/>
+          </a:xfrm>
+          <a:prstGeom prst="rect">
+            <a:avLst/>
+          </a:prstGeom>
+          <a:noFill/>
+          <a:ln>
+            <a:noFill/>
+          </a:ln>
+        </p:spPr>
+        <p:txBody>
+          <a:bodyPr lIns="91425" tIns="45700" rIns="91425" bIns="45700" anchor="t" anchorCtr="0">
+            <a:noAutofit/>
+          </a:bodyPr>
+          <a:lstStyle/>
+          <a:p>
+            <a:pPr marL="0" marR="0" lvl="0" indent="0" algn="l" rtl="0">
+              <a:spcBef>
+                <a:spcPts val="0"/>
+              </a:spcBef>
+              <a:buSzPct val="25000"/>
+              <a:buNone/>
+            </a:pPr>
+            <a:r>
+              <a:rPr lang="es-GT" sz="3600" dirty="0">
+                <a:solidFill>
+                  <a:srgbClr val="F7B600"/>
+                </a:solidFill>
+                <a:latin typeface="Raleway"/>
+                <a:ea typeface="Raleway"/>
+                <a:cs typeface="Raleway"/>
+                <a:sym typeface="Raleway"/>
+              </a:rPr>
+              <a:t>Proyecciones Cartográficas</a:t>
+            </a:r>
+            <a:endParaRPr lang="es-GT" sz="3600" b="0" i="0" u="none" strike="noStrike" cap="none" dirty="0">
+              <a:solidFill>
+                <a:srgbClr val="F7B600"/>
+              </a:solidFill>
+              <a:latin typeface="Raleway"/>
+              <a:ea typeface="Raleway"/>
+              <a:cs typeface="Raleway"/>
+              <a:sym typeface="Raleway"/>
+            </a:endParaRPr>
+          </a:p>
+        </p:txBody>
+      </p:sp>
+      <p:pic>
+        <p:nvPicPr>
+          <p:cNvPr id="4" name="Kj5VVjLh_xo">
+            <a:hlinkClick r:id="" action="ppaction://media"/>
+            <a:extLst>
+              <a:ext uri="{FF2B5EF4-FFF2-40B4-BE49-F238E27FC236}">
+                <a16:creationId xmlns:a16="http://schemas.microsoft.com/office/drawing/2014/main" id="{505D12F6-1E6C-46D8-BCE2-EC81D2416754}"/>
+              </a:ext>
+            </a:extLst>
+          </p:cNvPr>
+          <p:cNvPicPr>
+            <a:picLocks noRot="1" noChangeAspect="1"/>
+          </p:cNvPicPr>
+          <p:nvPr>
+            <a:videoFile r:link="rId1"/>
+          </p:nvPr>
+        </p:nvPicPr>
+        <p:blipFill>
+          <a:blip r:embed="rId5"/>
+          <a:stretch>
+            <a:fillRect/>
+          </a:stretch>
+        </p:blipFill>
+        <p:spPr>
+          <a:xfrm>
+            <a:off x="863031" y="1402237"/>
+            <a:ext cx="6909368" cy="5182026"/>
+          </a:xfrm>
+          <a:prstGeom prst="rect">
+            <a:avLst/>
+          </a:prstGeom>
+        </p:spPr>
+      </p:pic>
     </p:spTree>
     <p:extLst>
       <p:ext uri="{BB962C8B-B14F-4D97-AF65-F5344CB8AC3E}">
         <p14:creationId xmlns:p14="http://schemas.microsoft.com/office/powerpoint/2010/main" val="1269151904"/>
+      </p:ext>
+    </p:extLst>
+  </p:cSld>
+  <p:clrMapOvr>
+    <a:masterClrMapping/>
+  </p:clrMapOvr>
+</p:sld>
+</file>
+
+<file path=ppt/slides/slide4.xml><?xml version="1.0" encoding="utf-8"?>
+<p:sld xmlns:a="http://schemas.openxmlformats.org/drawingml/2006/main" xmlns:r="http://schemas.openxmlformats.org/officeDocument/2006/relationships" xmlns:p="http://schemas.openxmlformats.org/presentationml/2006/main">
+  <p:cSld>
+    <p:spTree>
+      <p:nvGrpSpPr>
+        <p:cNvPr id="1" name="Shape 392"/>
+        <p:cNvGrpSpPr/>
+        <p:nvPr/>
+      </p:nvGrpSpPr>
+      <p:grpSpPr>
+        <a:xfrm>
+          <a:off x="0" y="0"/>
+          <a:ext cx="0" cy="0"/>
+          <a:chOff x="0" y="0"/>
+          <a:chExt cx="0" cy="0"/>
+        </a:xfrm>
+      </p:grpSpPr>
+      <p:sp>
+        <p:nvSpPr>
+          <p:cNvPr id="393" name="Shape 393"/>
+          <p:cNvSpPr txBox="1">
+            <a:spLocks noGrp="1"/>
+          </p:cNvSpPr>
+          <p:nvPr>
+            <p:ph type="body" idx="1"/>
+          </p:nvPr>
+        </p:nvSpPr>
+        <p:spPr>
+          <a:xfrm>
+            <a:off x="405831" y="6160194"/>
+            <a:ext cx="8229600" cy="512860"/>
+          </a:xfrm>
+          <a:prstGeom prst="rect">
+            <a:avLst/>
+          </a:prstGeom>
+          <a:noFill/>
+          <a:ln>
+            <a:noFill/>
+          </a:ln>
+        </p:spPr>
+        <p:txBody>
+          <a:bodyPr lIns="91425" tIns="45700" rIns="91425" bIns="45700" anchor="t" anchorCtr="0">
+            <a:noAutofit/>
+          </a:bodyPr>
+          <a:lstStyle/>
+          <a:p>
+            <a:pPr marL="0" lvl="0" indent="0">
+              <a:lnSpc>
+                <a:spcPct val="90000"/>
+              </a:lnSpc>
+              <a:spcBef>
+                <a:spcPts val="0"/>
+              </a:spcBef>
+              <a:buSzPct val="25000"/>
+              <a:buNone/>
+            </a:pPr>
+            <a:r>
+              <a:rPr lang="es-VE" sz="1600" dirty="0">
+                <a:latin typeface="Raleway" panose="020B0604020202020204" charset="0"/>
+              </a:rPr>
+              <a:t>Fuente y más información en</a:t>
+            </a:r>
+            <a:r>
+              <a:rPr lang="es-VE" sz="1850" dirty="0">
+                <a:latin typeface="Raleway" panose="020B0604020202020204" charset="0"/>
+              </a:rPr>
+              <a:t>: </a:t>
+            </a:r>
+          </a:p>
+          <a:p>
+            <a:pPr marL="0" lvl="0" indent="0">
+              <a:lnSpc>
+                <a:spcPct val="90000"/>
+              </a:lnSpc>
+              <a:spcBef>
+                <a:spcPts val="0"/>
+              </a:spcBef>
+              <a:buSzPct val="25000"/>
+              <a:buNone/>
+            </a:pPr>
+            <a:r>
+              <a:rPr lang="es-VE" sz="1200" dirty="0">
+                <a:latin typeface="Raleway" panose="020B0604020202020204" charset="0"/>
+                <a:hlinkClick r:id="rId3"/>
+              </a:rPr>
+              <a:t>https://www.tableau.com/es-es/mapdata</a:t>
+            </a:r>
+            <a:endParaRPr lang="es-VE" sz="1200" dirty="0">
+              <a:latin typeface="Raleway" panose="020B0604020202020204" charset="0"/>
+            </a:endParaRPr>
+          </a:p>
+          <a:p>
+            <a:pPr marL="0" lvl="0" indent="0">
+              <a:lnSpc>
+                <a:spcPct val="90000"/>
+              </a:lnSpc>
+              <a:spcBef>
+                <a:spcPts val="0"/>
+              </a:spcBef>
+              <a:buSzPct val="25000"/>
+              <a:buNone/>
+            </a:pPr>
+            <a:endParaRPr lang="es-VE" sz="1200" dirty="0">
+              <a:latin typeface="Raleway" panose="020B0604020202020204" charset="0"/>
+            </a:endParaRPr>
+          </a:p>
+        </p:txBody>
+      </p:sp>
+      <p:sp>
+        <p:nvSpPr>
+          <p:cNvPr id="394" name="Shape 394"/>
+          <p:cNvSpPr txBox="1">
+            <a:spLocks noGrp="1"/>
+          </p:cNvSpPr>
+          <p:nvPr>
+            <p:ph type="title"/>
+          </p:nvPr>
+        </p:nvSpPr>
+        <p:spPr>
+          <a:xfrm>
+            <a:off x="666539" y="209956"/>
+            <a:ext cx="5192220" cy="428400"/>
+          </a:xfrm>
+          <a:prstGeom prst="rect">
+            <a:avLst/>
+          </a:prstGeom>
+          <a:noFill/>
+          <a:ln>
+            <a:noFill/>
+          </a:ln>
+        </p:spPr>
+        <p:txBody>
+          <a:bodyPr lIns="91425" tIns="45700" rIns="91425" bIns="45700" anchor="ctr" anchorCtr="0">
+            <a:noAutofit/>
+          </a:bodyPr>
+          <a:lstStyle/>
+          <a:p>
+            <a:pPr lvl="0" algn="l">
+              <a:buClr>
+                <a:srgbClr val="F7B600"/>
+              </a:buClr>
+              <a:buSzPct val="25000"/>
+            </a:pPr>
+            <a:r>
+              <a:rPr lang="es-VE" sz="1200" dirty="0">
+                <a:solidFill>
+                  <a:srgbClr val="F7B600"/>
+                </a:solidFill>
+                <a:latin typeface="Montserrat"/>
+                <a:ea typeface="Montserrat"/>
+                <a:cs typeface="Montserrat"/>
+                <a:sym typeface="Montserrat"/>
+              </a:rPr>
+              <a:t>6.1 Introducción a Coordenadas Geográficas</a:t>
+            </a:r>
+            <a:endParaRPr lang="es-VE" sz="1200" i="0" u="none" strike="noStrike" cap="none" dirty="0">
+              <a:solidFill>
+                <a:srgbClr val="F7B600"/>
+              </a:solidFill>
+              <a:latin typeface="Montserrat"/>
+              <a:ea typeface="Montserrat"/>
+              <a:cs typeface="Montserrat"/>
+              <a:sym typeface="Montserrat"/>
+            </a:endParaRPr>
+          </a:p>
+        </p:txBody>
+      </p:sp>
+      <p:pic>
+        <p:nvPicPr>
+          <p:cNvPr id="395" name="Shape 395" descr="isotipo codeacademy.png"/>
+          <p:cNvPicPr preferRelativeResize="0"/>
+          <p:nvPr/>
+        </p:nvPicPr>
+        <p:blipFill rotWithShape="1">
+          <a:blip r:embed="rId4">
+            <a:alphaModFix/>
+          </a:blip>
+          <a:srcRect/>
+          <a:stretch/>
+        </p:blipFill>
+        <p:spPr>
+          <a:xfrm>
+            <a:off x="131781" y="126082"/>
+            <a:ext cx="548100" cy="548100"/>
+          </a:xfrm>
+          <a:prstGeom prst="rect">
+            <a:avLst/>
+          </a:prstGeom>
+          <a:noFill/>
+          <a:ln>
+            <a:noFill/>
+          </a:ln>
+        </p:spPr>
+      </p:pic>
+      <p:sp>
+        <p:nvSpPr>
+          <p:cNvPr id="396" name="Shape 396"/>
+          <p:cNvSpPr txBox="1"/>
+          <p:nvPr/>
+        </p:nvSpPr>
+        <p:spPr>
+          <a:xfrm>
+            <a:off x="679881" y="674182"/>
+            <a:ext cx="8374564" cy="646200"/>
+          </a:xfrm>
+          <a:prstGeom prst="rect">
+            <a:avLst/>
+          </a:prstGeom>
+          <a:noFill/>
+          <a:ln>
+            <a:noFill/>
+          </a:ln>
+        </p:spPr>
+        <p:txBody>
+          <a:bodyPr lIns="91425" tIns="45700" rIns="91425" bIns="45700" anchor="t" anchorCtr="0">
+            <a:noAutofit/>
+          </a:bodyPr>
+          <a:lstStyle/>
+          <a:p>
+            <a:pPr marL="0" marR="0" lvl="0" indent="0" algn="l" rtl="0">
+              <a:spcBef>
+                <a:spcPts val="0"/>
+              </a:spcBef>
+              <a:buSzPct val="25000"/>
+              <a:buNone/>
+            </a:pPr>
+            <a:r>
+              <a:rPr lang="es-GT" sz="3600" dirty="0">
+                <a:solidFill>
+                  <a:srgbClr val="F7B600"/>
+                </a:solidFill>
+                <a:latin typeface="Raleway"/>
+                <a:ea typeface="Raleway"/>
+                <a:cs typeface="Raleway"/>
+                <a:sym typeface="Raleway"/>
+              </a:rPr>
+              <a:t>Coordenadas Geográficas en </a:t>
+            </a:r>
+            <a:r>
+              <a:rPr lang="es-GT" sz="3600" dirty="0" err="1">
+                <a:solidFill>
+                  <a:srgbClr val="F7B600"/>
+                </a:solidFill>
+                <a:latin typeface="Raleway"/>
+                <a:ea typeface="Raleway"/>
+                <a:cs typeface="Raleway"/>
+                <a:sym typeface="Raleway"/>
+              </a:rPr>
+              <a:t>Tableau</a:t>
+            </a:r>
+            <a:endParaRPr lang="es-GT" sz="3600" b="0" i="0" u="none" strike="noStrike" cap="none" dirty="0">
+              <a:solidFill>
+                <a:srgbClr val="F7B600"/>
+              </a:solidFill>
+              <a:latin typeface="Raleway"/>
+              <a:ea typeface="Raleway"/>
+              <a:cs typeface="Raleway"/>
+              <a:sym typeface="Raleway"/>
+            </a:endParaRPr>
+          </a:p>
+        </p:txBody>
+      </p:sp>
+      <p:sp>
+        <p:nvSpPr>
+          <p:cNvPr id="9" name="TextBox 8">
+            <a:extLst>
+              <a:ext uri="{FF2B5EF4-FFF2-40B4-BE49-F238E27FC236}">
+                <a16:creationId xmlns:a16="http://schemas.microsoft.com/office/drawing/2014/main" id="{55F34AC2-3A69-4CB8-88CD-31E25611B56E}"/>
+              </a:ext>
+            </a:extLst>
+          </p:cNvPr>
+          <p:cNvSpPr txBox="1"/>
+          <p:nvPr/>
+        </p:nvSpPr>
+        <p:spPr>
+          <a:xfrm flipH="1">
+            <a:off x="296945" y="1678006"/>
+            <a:ext cx="6066148" cy="307777"/>
+          </a:xfrm>
+          <a:prstGeom prst="rect">
+            <a:avLst/>
+          </a:prstGeom>
+          <a:noFill/>
+        </p:spPr>
+        <p:txBody>
+          <a:bodyPr wrap="square" rtlCol="0">
+            <a:spAutoFit/>
+          </a:bodyPr>
+          <a:lstStyle/>
+          <a:p>
+            <a:pPr algn="just"/>
+            <a:r>
+              <a:rPr lang="es-VE" dirty="0" err="1">
+                <a:latin typeface="Raleway" panose="020B0604020202020204" charset="0"/>
+              </a:rPr>
+              <a:t>Tableau</a:t>
+            </a:r>
+            <a:r>
+              <a:rPr lang="es-VE" dirty="0">
+                <a:latin typeface="Raleway" panose="020B0604020202020204" charset="0"/>
+              </a:rPr>
+              <a:t> tiene la capacidad de asignar roles geográficos a los campos, </a:t>
+            </a:r>
+            <a:endParaRPr lang="en-US" dirty="0">
+              <a:latin typeface="Raleway" panose="020B0604020202020204" charset="0"/>
+            </a:endParaRPr>
+          </a:p>
+        </p:txBody>
+      </p:sp>
+      <p:pic>
+        <p:nvPicPr>
+          <p:cNvPr id="2" name="Picture 1">
+            <a:extLst>
+              <a:ext uri="{FF2B5EF4-FFF2-40B4-BE49-F238E27FC236}">
+                <a16:creationId xmlns:a16="http://schemas.microsoft.com/office/drawing/2014/main" id="{DD2F977E-B1CE-411D-83FD-1AC664C9EF59}"/>
+              </a:ext>
+            </a:extLst>
+          </p:cNvPr>
+          <p:cNvPicPr>
+            <a:picLocks noChangeAspect="1"/>
+          </p:cNvPicPr>
+          <p:nvPr/>
+        </p:nvPicPr>
+        <p:blipFill>
+          <a:blip r:embed="rId5"/>
+          <a:stretch>
+            <a:fillRect/>
+          </a:stretch>
+        </p:blipFill>
+        <p:spPr>
+          <a:xfrm>
+            <a:off x="2507883" y="2290714"/>
+            <a:ext cx="3642517" cy="3469064"/>
+          </a:xfrm>
+          <a:prstGeom prst="rect">
+            <a:avLst/>
+          </a:prstGeom>
+        </p:spPr>
+      </p:pic>
+    </p:spTree>
+    <p:extLst>
+      <p:ext uri="{BB962C8B-B14F-4D97-AF65-F5344CB8AC3E}">
+        <p14:creationId xmlns:p14="http://schemas.microsoft.com/office/powerpoint/2010/main" val="4198151713"/>
+      </p:ext>
+    </p:extLst>
+  </p:cSld>
+  <p:clrMapOvr>
+    <a:masterClrMapping/>
+  </p:clrMapOvr>
+</p:sld>
+</file>
+
+<file path=ppt/slides/slide5.xml><?xml version="1.0" encoding="utf-8"?>
+<p:sld xmlns:a="http://schemas.openxmlformats.org/drawingml/2006/main" xmlns:r="http://schemas.openxmlformats.org/officeDocument/2006/relationships" xmlns:p="http://schemas.openxmlformats.org/presentationml/2006/main">
+  <p:cSld>
+    <p:spTree>
+      <p:nvGrpSpPr>
+        <p:cNvPr id="1" name="Shape 392"/>
+        <p:cNvGrpSpPr/>
+        <p:nvPr/>
+      </p:nvGrpSpPr>
+      <p:grpSpPr>
+        <a:xfrm>
+          <a:off x="0" y="0"/>
+          <a:ext cx="0" cy="0"/>
+          <a:chOff x="0" y="0"/>
+          <a:chExt cx="0" cy="0"/>
+        </a:xfrm>
+      </p:grpSpPr>
+      <p:sp>
+        <p:nvSpPr>
+          <p:cNvPr id="393" name="Shape 393"/>
+          <p:cNvSpPr txBox="1">
+            <a:spLocks noGrp="1"/>
+          </p:cNvSpPr>
+          <p:nvPr>
+            <p:ph type="body" idx="1"/>
+          </p:nvPr>
+        </p:nvSpPr>
+        <p:spPr>
+          <a:xfrm>
+            <a:off x="405831" y="6160194"/>
+            <a:ext cx="8229600" cy="512860"/>
+          </a:xfrm>
+          <a:prstGeom prst="rect">
+            <a:avLst/>
+          </a:prstGeom>
+          <a:noFill/>
+          <a:ln>
+            <a:noFill/>
+          </a:ln>
+        </p:spPr>
+        <p:txBody>
+          <a:bodyPr lIns="91425" tIns="45700" rIns="91425" bIns="45700" anchor="t" anchorCtr="0">
+            <a:noAutofit/>
+          </a:bodyPr>
+          <a:lstStyle/>
+          <a:p>
+            <a:pPr marL="0" lvl="0" indent="0">
+              <a:lnSpc>
+                <a:spcPct val="90000"/>
+              </a:lnSpc>
+              <a:spcBef>
+                <a:spcPts val="0"/>
+              </a:spcBef>
+              <a:buSzPct val="25000"/>
+              <a:buNone/>
+            </a:pPr>
+            <a:r>
+              <a:rPr lang="es-VE" sz="1600" dirty="0">
+                <a:latin typeface="Raleway" panose="020B0604020202020204" charset="0"/>
+              </a:rPr>
+              <a:t>Fuente y más información en</a:t>
+            </a:r>
+            <a:r>
+              <a:rPr lang="es-VE" sz="1850" dirty="0">
+                <a:latin typeface="Raleway" panose="020B0604020202020204" charset="0"/>
+              </a:rPr>
+              <a:t>: </a:t>
+            </a:r>
+          </a:p>
+          <a:p>
+            <a:pPr marL="0" lvl="0" indent="0">
+              <a:lnSpc>
+                <a:spcPct val="90000"/>
+              </a:lnSpc>
+              <a:spcBef>
+                <a:spcPts val="0"/>
+              </a:spcBef>
+              <a:buSzPct val="25000"/>
+              <a:buNone/>
+            </a:pPr>
+            <a:r>
+              <a:rPr lang="es-VE" sz="1200" dirty="0">
+                <a:latin typeface="Raleway" panose="020B0604020202020204" charset="0"/>
+                <a:hlinkClick r:id="rId3"/>
+              </a:rPr>
+              <a:t>https://public.tableau.com/es-es/s/blog/2017/03/tackle-your-geospatial-analysis-ease-tableau-102</a:t>
+            </a:r>
+            <a:endParaRPr lang="es-VE" sz="1200" dirty="0">
+              <a:latin typeface="Raleway" panose="020B0604020202020204" charset="0"/>
+            </a:endParaRPr>
+          </a:p>
+          <a:p>
+            <a:pPr marL="0" lvl="0" indent="0">
+              <a:lnSpc>
+                <a:spcPct val="90000"/>
+              </a:lnSpc>
+              <a:spcBef>
+                <a:spcPts val="0"/>
+              </a:spcBef>
+              <a:buSzPct val="25000"/>
+              <a:buNone/>
+            </a:pPr>
+            <a:endParaRPr lang="es-VE" sz="1200" dirty="0">
+              <a:latin typeface="Raleway" panose="020B0604020202020204" charset="0"/>
+            </a:endParaRPr>
+          </a:p>
+          <a:p>
+            <a:pPr marL="0" lvl="0" indent="0">
+              <a:lnSpc>
+                <a:spcPct val="90000"/>
+              </a:lnSpc>
+              <a:spcBef>
+                <a:spcPts val="0"/>
+              </a:spcBef>
+              <a:buSzPct val="25000"/>
+              <a:buNone/>
+            </a:pPr>
+            <a:endParaRPr lang="es-VE" sz="1200" dirty="0">
+              <a:latin typeface="Raleway" panose="020B0604020202020204" charset="0"/>
+            </a:endParaRPr>
+          </a:p>
+        </p:txBody>
+      </p:sp>
+      <p:sp>
+        <p:nvSpPr>
+          <p:cNvPr id="394" name="Shape 394"/>
+          <p:cNvSpPr txBox="1">
+            <a:spLocks noGrp="1"/>
+          </p:cNvSpPr>
+          <p:nvPr>
+            <p:ph type="title"/>
+          </p:nvPr>
+        </p:nvSpPr>
+        <p:spPr>
+          <a:xfrm>
+            <a:off x="666539" y="209956"/>
+            <a:ext cx="5192220" cy="428400"/>
+          </a:xfrm>
+          <a:prstGeom prst="rect">
+            <a:avLst/>
+          </a:prstGeom>
+          <a:noFill/>
+          <a:ln>
+            <a:noFill/>
+          </a:ln>
+        </p:spPr>
+        <p:txBody>
+          <a:bodyPr lIns="91425" tIns="45700" rIns="91425" bIns="45700" anchor="ctr" anchorCtr="0">
+            <a:noAutofit/>
+          </a:bodyPr>
+          <a:lstStyle/>
+          <a:p>
+            <a:pPr lvl="0" algn="l">
+              <a:buClr>
+                <a:srgbClr val="F7B600"/>
+              </a:buClr>
+              <a:buSzPct val="25000"/>
+            </a:pPr>
+            <a:r>
+              <a:rPr lang="es-VE" sz="1200" dirty="0">
+                <a:solidFill>
+                  <a:srgbClr val="F7B600"/>
+                </a:solidFill>
+                <a:latin typeface="Montserrat"/>
+                <a:ea typeface="Montserrat"/>
+                <a:cs typeface="Montserrat"/>
+                <a:sym typeface="Montserrat"/>
+              </a:rPr>
+              <a:t>6.1 Introducción a Coordenadas Geográficas</a:t>
+            </a:r>
+            <a:endParaRPr lang="es-VE" sz="1200" i="0" u="none" strike="noStrike" cap="none" dirty="0">
+              <a:solidFill>
+                <a:srgbClr val="F7B600"/>
+              </a:solidFill>
+              <a:latin typeface="Montserrat"/>
+              <a:ea typeface="Montserrat"/>
+              <a:cs typeface="Montserrat"/>
+              <a:sym typeface="Montserrat"/>
+            </a:endParaRPr>
+          </a:p>
+        </p:txBody>
+      </p:sp>
+      <p:pic>
+        <p:nvPicPr>
+          <p:cNvPr id="395" name="Shape 395" descr="isotipo codeacademy.png"/>
+          <p:cNvPicPr preferRelativeResize="0"/>
+          <p:nvPr/>
+        </p:nvPicPr>
+        <p:blipFill rotWithShape="1">
+          <a:blip r:embed="rId4">
+            <a:alphaModFix/>
+          </a:blip>
+          <a:srcRect/>
+          <a:stretch/>
+        </p:blipFill>
+        <p:spPr>
+          <a:xfrm>
+            <a:off x="131781" y="126082"/>
+            <a:ext cx="548100" cy="548100"/>
+          </a:xfrm>
+          <a:prstGeom prst="rect">
+            <a:avLst/>
+          </a:prstGeom>
+          <a:noFill/>
+          <a:ln>
+            <a:noFill/>
+          </a:ln>
+        </p:spPr>
+      </p:pic>
+      <p:sp>
+        <p:nvSpPr>
+          <p:cNvPr id="396" name="Shape 396"/>
+          <p:cNvSpPr txBox="1"/>
+          <p:nvPr/>
+        </p:nvSpPr>
+        <p:spPr>
+          <a:xfrm>
+            <a:off x="679881" y="674182"/>
+            <a:ext cx="8374564" cy="646200"/>
+          </a:xfrm>
+          <a:prstGeom prst="rect">
+            <a:avLst/>
+          </a:prstGeom>
+          <a:noFill/>
+          <a:ln>
+            <a:noFill/>
+          </a:ln>
+        </p:spPr>
+        <p:txBody>
+          <a:bodyPr lIns="91425" tIns="45700" rIns="91425" bIns="45700" anchor="t" anchorCtr="0">
+            <a:noAutofit/>
+          </a:bodyPr>
+          <a:lstStyle/>
+          <a:p>
+            <a:pPr marL="0" marR="0" lvl="0" indent="0" algn="l" rtl="0">
+              <a:spcBef>
+                <a:spcPts val="0"/>
+              </a:spcBef>
+              <a:buSzPct val="25000"/>
+              <a:buNone/>
+            </a:pPr>
+            <a:r>
+              <a:rPr lang="es-GT" sz="3600" dirty="0">
+                <a:solidFill>
+                  <a:srgbClr val="F7B600"/>
+                </a:solidFill>
+                <a:latin typeface="Raleway"/>
+                <a:ea typeface="Raleway"/>
+                <a:cs typeface="Raleway"/>
+                <a:sym typeface="Raleway"/>
+              </a:rPr>
+              <a:t>Áreas Espaciales en </a:t>
+            </a:r>
+            <a:r>
+              <a:rPr lang="es-GT" sz="3600" dirty="0" err="1">
+                <a:solidFill>
+                  <a:srgbClr val="F7B600"/>
+                </a:solidFill>
+                <a:latin typeface="Raleway"/>
+                <a:ea typeface="Raleway"/>
+                <a:cs typeface="Raleway"/>
+                <a:sym typeface="Raleway"/>
+              </a:rPr>
+              <a:t>Tableau</a:t>
+            </a:r>
+            <a:endParaRPr lang="es-GT" sz="3600" b="0" i="0" u="none" strike="noStrike" cap="none" dirty="0">
+              <a:solidFill>
+                <a:srgbClr val="F7B600"/>
+              </a:solidFill>
+              <a:latin typeface="Raleway"/>
+              <a:ea typeface="Raleway"/>
+              <a:cs typeface="Raleway"/>
+              <a:sym typeface="Raleway"/>
+            </a:endParaRPr>
+          </a:p>
+        </p:txBody>
+      </p:sp>
+      <p:sp>
+        <p:nvSpPr>
+          <p:cNvPr id="9" name="TextBox 8">
+            <a:extLst>
+              <a:ext uri="{FF2B5EF4-FFF2-40B4-BE49-F238E27FC236}">
+                <a16:creationId xmlns:a16="http://schemas.microsoft.com/office/drawing/2014/main" id="{55F34AC2-3A69-4CB8-88CD-31E25611B56E}"/>
+              </a:ext>
+            </a:extLst>
+          </p:cNvPr>
+          <p:cNvSpPr txBox="1"/>
+          <p:nvPr/>
+        </p:nvSpPr>
+        <p:spPr>
+          <a:xfrm flipH="1">
+            <a:off x="296945" y="1678006"/>
+            <a:ext cx="8196606" cy="307777"/>
+          </a:xfrm>
+          <a:prstGeom prst="rect">
+            <a:avLst/>
+          </a:prstGeom>
+          <a:noFill/>
+        </p:spPr>
+        <p:txBody>
+          <a:bodyPr wrap="square" rtlCol="0">
+            <a:spAutoFit/>
+          </a:bodyPr>
+          <a:lstStyle/>
+          <a:p>
+            <a:pPr algn="just"/>
+            <a:r>
+              <a:rPr lang="es-VE" dirty="0">
+                <a:latin typeface="Raleway" panose="020B0604020202020204" charset="0"/>
+              </a:rPr>
+              <a:t>Además con la versión paga de </a:t>
+            </a:r>
+            <a:r>
+              <a:rPr lang="es-VE" dirty="0" err="1">
+                <a:latin typeface="Raleway" panose="020B0604020202020204" charset="0"/>
+              </a:rPr>
+              <a:t>Tableau</a:t>
+            </a:r>
+            <a:r>
+              <a:rPr lang="es-VE" dirty="0">
+                <a:latin typeface="Raleway" panose="020B0604020202020204" charset="0"/>
+              </a:rPr>
+              <a:t>, puedes graficar tus propios polígonos o áreas:</a:t>
+            </a:r>
+            <a:endParaRPr lang="en-US" dirty="0">
+              <a:latin typeface="Raleway" panose="020B0604020202020204" charset="0"/>
+            </a:endParaRPr>
+          </a:p>
+        </p:txBody>
+      </p:sp>
+      <p:pic>
+        <p:nvPicPr>
+          <p:cNvPr id="3" name="Picture 2">
+            <a:extLst>
+              <a:ext uri="{FF2B5EF4-FFF2-40B4-BE49-F238E27FC236}">
+                <a16:creationId xmlns:a16="http://schemas.microsoft.com/office/drawing/2014/main" id="{0C1C76A3-4706-4DA4-B7D3-4DDE8B414D34}"/>
+              </a:ext>
+            </a:extLst>
+          </p:cNvPr>
+          <p:cNvPicPr>
+            <a:picLocks noChangeAspect="1"/>
+          </p:cNvPicPr>
+          <p:nvPr/>
+        </p:nvPicPr>
+        <p:blipFill>
+          <a:blip r:embed="rId5"/>
+          <a:stretch>
+            <a:fillRect/>
+          </a:stretch>
+        </p:blipFill>
+        <p:spPr>
+          <a:xfrm>
+            <a:off x="1350868" y="2140904"/>
+            <a:ext cx="6339526" cy="3943756"/>
+          </a:xfrm>
+          <a:prstGeom prst="rect">
+            <a:avLst/>
+          </a:prstGeom>
+        </p:spPr>
+      </p:pic>
+    </p:spTree>
+    <p:extLst>
+      <p:ext uri="{BB962C8B-B14F-4D97-AF65-F5344CB8AC3E}">
+        <p14:creationId xmlns:p14="http://schemas.microsoft.com/office/powerpoint/2010/main" val="2932478978"/>
+      </p:ext>
+    </p:extLst>
+  </p:cSld>
+  <p:clrMapOvr>
+    <a:masterClrMapping/>
+  </p:clrMapOvr>
+</p:sld>
+</file>
+
+<file path=ppt/slides/slide6.xml><?xml version="1.0" encoding="utf-8"?>
+<p:sld xmlns:a="http://schemas.openxmlformats.org/drawingml/2006/main" xmlns:r="http://schemas.openxmlformats.org/officeDocument/2006/relationships" xmlns:p="http://schemas.openxmlformats.org/presentationml/2006/main">
+  <p:cSld>
+    <p:spTree>
+      <p:nvGrpSpPr>
+        <p:cNvPr id="1" name="Shape 392"/>
+        <p:cNvGrpSpPr/>
+        <p:nvPr/>
+      </p:nvGrpSpPr>
+      <p:grpSpPr>
+        <a:xfrm>
+          <a:off x="0" y="0"/>
+          <a:ext cx="0" cy="0"/>
+          <a:chOff x="0" y="0"/>
+          <a:chExt cx="0" cy="0"/>
+        </a:xfrm>
+      </p:grpSpPr>
+      <p:sp>
+        <p:nvSpPr>
+          <p:cNvPr id="394" name="Shape 394"/>
+          <p:cNvSpPr txBox="1">
+            <a:spLocks noGrp="1"/>
+          </p:cNvSpPr>
+          <p:nvPr>
+            <p:ph type="title"/>
+          </p:nvPr>
+        </p:nvSpPr>
+        <p:spPr>
+          <a:xfrm>
+            <a:off x="666539" y="209956"/>
+            <a:ext cx="5192220" cy="428400"/>
+          </a:xfrm>
+          <a:prstGeom prst="rect">
+            <a:avLst/>
+          </a:prstGeom>
+          <a:noFill/>
+          <a:ln>
+            <a:noFill/>
+          </a:ln>
+        </p:spPr>
+        <p:txBody>
+          <a:bodyPr lIns="91425" tIns="45700" rIns="91425" bIns="45700" anchor="ctr" anchorCtr="0">
+            <a:noAutofit/>
+          </a:bodyPr>
+          <a:lstStyle/>
+          <a:p>
+            <a:pPr lvl="0" algn="l">
+              <a:buClr>
+                <a:srgbClr val="F7B600"/>
+              </a:buClr>
+              <a:buSzPct val="25000"/>
+            </a:pPr>
+            <a:r>
+              <a:rPr lang="es-VE" sz="1200" dirty="0">
+                <a:solidFill>
+                  <a:srgbClr val="F7B600"/>
+                </a:solidFill>
+                <a:latin typeface="Montserrat"/>
+                <a:ea typeface="Montserrat"/>
+                <a:cs typeface="Montserrat"/>
+                <a:sym typeface="Montserrat"/>
+              </a:rPr>
+              <a:t>6.1 Introducción a Coordenadas Geográficas</a:t>
+            </a:r>
+            <a:endParaRPr lang="es-VE" sz="1200" i="0" u="none" strike="noStrike" cap="none" dirty="0">
+              <a:solidFill>
+                <a:srgbClr val="F7B600"/>
+              </a:solidFill>
+              <a:latin typeface="Montserrat"/>
+              <a:ea typeface="Montserrat"/>
+              <a:cs typeface="Montserrat"/>
+              <a:sym typeface="Montserrat"/>
+            </a:endParaRPr>
+          </a:p>
+        </p:txBody>
+      </p:sp>
+      <p:pic>
+        <p:nvPicPr>
+          <p:cNvPr id="395" name="Shape 395" descr="isotipo codeacademy.png"/>
+          <p:cNvPicPr preferRelativeResize="0"/>
+          <p:nvPr/>
+        </p:nvPicPr>
+        <p:blipFill rotWithShape="1">
+          <a:blip r:embed="rId3">
+            <a:alphaModFix/>
+          </a:blip>
+          <a:srcRect/>
+          <a:stretch/>
+        </p:blipFill>
+        <p:spPr>
+          <a:xfrm>
+            <a:off x="131781" y="126082"/>
+            <a:ext cx="548100" cy="548100"/>
+          </a:xfrm>
+          <a:prstGeom prst="rect">
+            <a:avLst/>
+          </a:prstGeom>
+          <a:noFill/>
+          <a:ln>
+            <a:noFill/>
+          </a:ln>
+        </p:spPr>
+      </p:pic>
+      <p:sp>
+        <p:nvSpPr>
+          <p:cNvPr id="396" name="Shape 396"/>
+          <p:cNvSpPr txBox="1"/>
+          <p:nvPr/>
+        </p:nvSpPr>
+        <p:spPr>
+          <a:xfrm>
+            <a:off x="549039" y="674182"/>
+            <a:ext cx="8064630" cy="646200"/>
+          </a:xfrm>
+          <a:prstGeom prst="rect">
+            <a:avLst/>
+          </a:prstGeom>
+          <a:noFill/>
+          <a:ln>
+            <a:noFill/>
+          </a:ln>
+        </p:spPr>
+        <p:txBody>
+          <a:bodyPr lIns="91425" tIns="45700" rIns="91425" bIns="45700" anchor="t" anchorCtr="0">
+            <a:noAutofit/>
+          </a:bodyPr>
+          <a:lstStyle/>
+          <a:p>
+            <a:pPr marL="0" marR="0" lvl="0" indent="0" algn="l" rtl="0">
+              <a:spcBef>
+                <a:spcPts val="0"/>
+              </a:spcBef>
+              <a:buSzPct val="25000"/>
+              <a:buNone/>
+            </a:pPr>
+            <a:r>
+              <a:rPr lang="es-GT" sz="3600" dirty="0">
+                <a:solidFill>
+                  <a:srgbClr val="F7B600"/>
+                </a:solidFill>
+                <a:latin typeface="Raleway"/>
+                <a:ea typeface="Raleway"/>
+                <a:cs typeface="Raleway"/>
+                <a:sym typeface="Raleway"/>
+              </a:rPr>
+              <a:t>Consideraciones en otros software</a:t>
+            </a:r>
+            <a:endParaRPr lang="es-GT" sz="3600" b="0" i="0" u="none" strike="noStrike" cap="none" dirty="0">
+              <a:solidFill>
+                <a:srgbClr val="F7B600"/>
+              </a:solidFill>
+              <a:latin typeface="Raleway"/>
+              <a:ea typeface="Raleway"/>
+              <a:cs typeface="Raleway"/>
+              <a:sym typeface="Raleway"/>
+            </a:endParaRPr>
+          </a:p>
+        </p:txBody>
+      </p:sp>
+      <p:sp>
+        <p:nvSpPr>
+          <p:cNvPr id="10" name="TextBox 9">
+            <a:extLst>
+              <a:ext uri="{FF2B5EF4-FFF2-40B4-BE49-F238E27FC236}">
+                <a16:creationId xmlns:a16="http://schemas.microsoft.com/office/drawing/2014/main" id="{9DEACD23-66D1-49A0-99E5-70BF2D1402C1}"/>
+              </a:ext>
+            </a:extLst>
+          </p:cNvPr>
+          <p:cNvSpPr txBox="1"/>
+          <p:nvPr/>
+        </p:nvSpPr>
+        <p:spPr>
+          <a:xfrm flipH="1">
+            <a:off x="348648" y="1659697"/>
+            <a:ext cx="8465413" cy="3693319"/>
+          </a:xfrm>
+          <a:prstGeom prst="rect">
+            <a:avLst/>
+          </a:prstGeom>
+          <a:noFill/>
+        </p:spPr>
+        <p:txBody>
+          <a:bodyPr wrap="square" rtlCol="0">
+            <a:spAutoFit/>
+          </a:bodyPr>
+          <a:lstStyle/>
+          <a:p>
+            <a:r>
+              <a:rPr lang="es-VE" sz="1800" dirty="0">
+                <a:latin typeface="Raleway" panose="020B0604020202020204" charset="0"/>
+              </a:rPr>
+              <a:t>Conceptos que debes estudiar al trabajar con data Geoespacial en otros software:</a:t>
+            </a:r>
+          </a:p>
+          <a:p>
+            <a:endParaRPr lang="es-ES" sz="1800" dirty="0">
+              <a:latin typeface="Raleway" panose="020B0604020202020204" charset="0"/>
+            </a:endParaRPr>
+          </a:p>
+          <a:p>
+            <a:pPr marL="285750" indent="-285750">
+              <a:buFont typeface="Arial" panose="020B0604020202020204" pitchFamily="34" charset="0"/>
+              <a:buChar char="•"/>
+            </a:pPr>
+            <a:r>
+              <a:rPr lang="es-ES" sz="1800" dirty="0">
+                <a:latin typeface="Raleway" panose="020B0604020202020204" charset="0"/>
+              </a:rPr>
+              <a:t>Cambio en las unidades de las coordenadas geográficas de Radianes a ángulos y a sistema decimal. </a:t>
+            </a:r>
+          </a:p>
+          <a:p>
+            <a:pPr marL="285750" indent="-285750">
+              <a:buFont typeface="Arial" panose="020B0604020202020204" pitchFamily="34" charset="0"/>
+              <a:buChar char="•"/>
+            </a:pPr>
+            <a:r>
+              <a:rPr lang="es-ES" sz="1800" dirty="0">
+                <a:latin typeface="Raleway" panose="020B0604020202020204" charset="0"/>
+              </a:rPr>
+              <a:t>Trabajo con archivos que contienen estructuras de polígonos espaciales o extensión .</a:t>
+            </a:r>
+            <a:r>
+              <a:rPr lang="es-ES" sz="1800" dirty="0" err="1">
+                <a:latin typeface="Raleway" panose="020B0604020202020204" charset="0"/>
+              </a:rPr>
+              <a:t>shp</a:t>
+            </a:r>
+            <a:endParaRPr lang="es-ES" sz="1800" dirty="0">
+              <a:latin typeface="Raleway" panose="020B0604020202020204" charset="0"/>
+            </a:endParaRPr>
+          </a:p>
+          <a:p>
+            <a:pPr marL="285750" indent="-285750">
+              <a:buFont typeface="Arial" panose="020B0604020202020204" pitchFamily="34" charset="0"/>
+              <a:buChar char="•"/>
+            </a:pPr>
+            <a:r>
+              <a:rPr lang="es-ES" sz="1800" dirty="0">
+                <a:latin typeface="Raleway" panose="020B0604020202020204" charset="0"/>
+              </a:rPr>
+              <a:t>Trabajo con el sistema referencial de coordenadas o CRS por su siglas en inglés. </a:t>
+            </a:r>
+          </a:p>
+          <a:p>
+            <a:pPr marL="285750" indent="-285750">
+              <a:buFont typeface="Arial" panose="020B0604020202020204" pitchFamily="34" charset="0"/>
+              <a:buChar char="•"/>
+            </a:pPr>
+            <a:r>
+              <a:rPr lang="es-ES" sz="1800" dirty="0">
+                <a:latin typeface="Raleway" panose="020B0604020202020204" charset="0"/>
+              </a:rPr>
+              <a:t>Cálculo de Distancia entre 2 puntos.</a:t>
+            </a:r>
+          </a:p>
+          <a:p>
+            <a:pPr marL="285750" indent="-285750">
+              <a:buFont typeface="Arial" panose="020B0604020202020204" pitchFamily="34" charset="0"/>
+              <a:buChar char="•"/>
+            </a:pPr>
+            <a:endParaRPr lang="es-ES" sz="1800" dirty="0">
+              <a:latin typeface="Raleway" panose="020B0604020202020204" charset="0"/>
+            </a:endParaRPr>
+          </a:p>
+          <a:p>
+            <a:r>
+              <a:rPr lang="es-ES" sz="1800" dirty="0">
+                <a:latin typeface="Raleway" panose="020B0604020202020204" charset="0"/>
+              </a:rPr>
+              <a:t>Además busca la referencia o CRS que mejor funciona para tus puntos en este sitio: </a:t>
+            </a:r>
+            <a:r>
+              <a:rPr lang="es-ES" sz="1800" dirty="0">
+                <a:latin typeface="Raleway" panose="020B0604020202020204" charset="0"/>
+                <a:hlinkClick r:id="rId4"/>
+              </a:rPr>
+              <a:t>http://spatialreference.org/ref/</a:t>
+            </a:r>
+            <a:r>
+              <a:rPr lang="es-ES" sz="1800" dirty="0">
+                <a:latin typeface="Raleway" panose="020B0604020202020204" charset="0"/>
+              </a:rPr>
+              <a:t> </a:t>
+            </a:r>
+            <a:endParaRPr lang="en-US" sz="1800" dirty="0">
+              <a:latin typeface="Raleway" panose="020B0604020202020204" charset="0"/>
+            </a:endParaRPr>
+          </a:p>
+        </p:txBody>
+      </p:sp>
+    </p:spTree>
+    <p:extLst>
+      <p:ext uri="{BB962C8B-B14F-4D97-AF65-F5344CB8AC3E}">
+        <p14:creationId xmlns:p14="http://schemas.microsoft.com/office/powerpoint/2010/main" val="595441345"/>
       </p:ext>
     </p:extLst>
   </p:cSld>

</xml_diff>